<commit_message>
Progress: Updating for CCC 2013
</commit_message>
<xml_diff>
--- a/TestDrivingASP.NETMVC.pptx
+++ b/TestDrivingASP.NETMVC.pptx
@@ -517,7 +517,7 @@
               <a:pPr>
                 <a:defRPr/>
               </a:pPr>
-              <a:t>8/31/2012</a:t>
+              <a:t>4/21/2013</a:t>
             </a:fld>
             <a:endParaRPr lang="en-US"/>
           </a:p>
@@ -982,6 +982,7 @@
             <a:prstTxWarp prst="textNoShape">
               <a:avLst/>
             </a:prstTxWarp>
+            <a:normAutofit fontScale="92500" lnSpcReduction="20000"/>
           </a:bodyPr>
           <a:lstStyle/>
           <a:p>
@@ -1155,6 +1156,7 @@
             <a:prstTxWarp prst="textNoShape">
               <a:avLst/>
             </a:prstTxWarp>
+            <a:normAutofit fontScale="77500" lnSpcReduction="20000"/>
           </a:bodyPr>
           <a:lstStyle/>
           <a:p>
@@ -1475,6 +1477,7 @@
             <a:prstTxWarp prst="textNoShape">
               <a:avLst/>
             </a:prstTxWarp>
+            <a:normAutofit lnSpcReduction="10000"/>
           </a:bodyPr>
           <a:lstStyle/>
           <a:p>
@@ -1717,6 +1720,7 @@
             <a:prstTxWarp prst="textNoShape">
               <a:avLst/>
             </a:prstTxWarp>
+            <a:normAutofit fontScale="55000" lnSpcReduction="20000"/>
           </a:bodyPr>
           <a:lstStyle/>
           <a:p>
@@ -2389,6 +2393,7 @@
             <a:prstTxWarp prst="textNoShape">
               <a:avLst/>
             </a:prstTxWarp>
+            <a:normAutofit fontScale="85000" lnSpcReduction="20000"/>
           </a:bodyPr>
           <a:lstStyle/>
           <a:p>
@@ -2648,6 +2653,7 @@
             <a:prstTxWarp prst="textNoShape">
               <a:avLst/>
             </a:prstTxWarp>
+            <a:normAutofit fontScale="92500" lnSpcReduction="20000"/>
           </a:bodyPr>
           <a:lstStyle/>
           <a:p>
@@ -2961,8 +2967,27 @@
             </a:r>
             <a:r>
               <a:rPr lang="en-US" sz="1400" baseline="0" dirty="0" smtClean="0"/>
-              <a:t> is a project designed to additional functionality and ease of use to MVC</a:t>
-            </a:r>
+              <a:t> is a project designed to additional functionality and ease of use to </a:t>
+            </a:r>
+            <a:r>
+              <a:rPr lang="en-US" sz="1400" baseline="0" dirty="0" smtClean="0"/>
+              <a:t>MVC</a:t>
+            </a:r>
+          </a:p>
+          <a:p>
+            <a:pPr marL="285750" lvl="0" indent="-285750" algn="l">
+              <a:buFontTx/>
+              <a:buChar char="-"/>
+            </a:pPr>
+            <a:r>
+              <a:rPr lang="en-US" sz="1400" baseline="0" dirty="0" smtClean="0"/>
+              <a:t>Hosted on </a:t>
+            </a:r>
+            <a:r>
+              <a:rPr lang="en-US" sz="1400" baseline="0" dirty="0" err="1" smtClean="0"/>
+              <a:t>CodePlex</a:t>
+            </a:r>
+            <a:endParaRPr lang="en-US" sz="1400" baseline="0" dirty="0" smtClean="0"/>
           </a:p>
           <a:p>
             <a:pPr marL="285750" lvl="0" indent="-285750" algn="l">
@@ -3486,6 +3511,7 @@
             <a:prstTxWarp prst="textNoShape">
               <a:avLst/>
             </a:prstTxWarp>
+            <a:normAutofit fontScale="32500" lnSpcReduction="20000"/>
           </a:bodyPr>
           <a:lstStyle/>
           <a:p>
@@ -3499,7 +3525,11 @@
             </a:r>
             <a:r>
               <a:rPr lang="en-US" b="1" baseline="0" dirty="0" smtClean="0"/>
-              <a:t> Start by F5’ing and showing up</a:t>
+              <a:t> Start by F5’ing and showing </a:t>
+            </a:r>
+            <a:r>
+              <a:rPr lang="en-US" b="1" baseline="0" dirty="0" smtClean="0"/>
+              <a:t>what application does</a:t>
             </a:r>
             <a:endParaRPr lang="en-US" b="1" dirty="0" smtClean="0"/>
           </a:p>
@@ -4107,6 +4137,28 @@
                 <a:cs typeface="+mn-cs"/>
               </a:rPr>
               <a:t>Trace.axd</a:t>
+            </a:r>
+            <a:r>
+              <a:rPr lang="en-US" sz="1200" kern="1200" baseline="0" dirty="0" smtClean="0">
+                <a:solidFill>
+                  <a:schemeClr val="tx1"/>
+                </a:solidFill>
+                <a:latin typeface="+mn-lt"/>
+                <a:ea typeface="+mn-ea"/>
+                <a:cs typeface="+mn-cs"/>
+              </a:rPr>
+              <a:t>: </a:t>
+            </a:r>
+            <a:r>
+              <a:rPr lang="en-US" sz="1200" b="1" kern="1200" baseline="0" dirty="0" smtClean="0">
+                <a:solidFill>
+                  <a:schemeClr val="tx1"/>
+                </a:solidFill>
+                <a:latin typeface="+mn-lt"/>
+                <a:ea typeface="+mn-ea"/>
+                <a:cs typeface="+mn-cs"/>
+              </a:rPr>
+              <a:t>tddmvc3</a:t>
             </a:r>
             <a:endParaRPr lang="en-US" sz="1200" kern="1200" baseline="0" dirty="0" smtClean="0">
               <a:solidFill>
@@ -4682,6 +4734,7 @@
             <a:prstTxWarp prst="textNoShape">
               <a:avLst/>
             </a:prstTxWarp>
+            <a:normAutofit fontScale="25000" lnSpcReduction="20000"/>
           </a:bodyPr>
           <a:lstStyle/>
           <a:p>
@@ -4695,24 +4748,15 @@
             </a:r>
           </a:p>
           <a:p>
-            <a:pPr marL="800100" lvl="1" indent="-342900" algn="l">
-              <a:buFont typeface="Arial" pitchFamily="34" charset="0"/>
-              <a:buAutoNum type="arabicPeriod"/>
-            </a:pPr>
-            <a:r>
-              <a:rPr lang="en-US" sz="1400" baseline="0" dirty="0" smtClean="0"/>
-              <a:t>Controller Project</a:t>
-            </a:r>
-          </a:p>
-          <a:p>
             <a:pPr marL="1200150" lvl="2" indent="-285750" algn="l">
               <a:buFontTx/>
               <a:buChar char="-"/>
             </a:pPr>
             <a:r>
-              <a:rPr lang="en-US" sz="1400" baseline="0" dirty="0" smtClean="0"/>
-              <a:t>Yes, I put my controller’s in their own project…explain why</a:t>
-            </a:r>
+              <a:rPr lang="en-US" sz="1400" baseline="0" dirty="0" err="1" smtClean="0"/>
+              <a:t>CustomerController</a:t>
+            </a:r>
+            <a:endParaRPr lang="en-US" sz="1400" baseline="0" dirty="0" smtClean="0"/>
           </a:p>
           <a:p>
             <a:pPr marL="1200150" lvl="2" indent="-285750" algn="l">
@@ -4721,19 +4765,15 @@
             </a:pPr>
             <a:r>
               <a:rPr lang="en-US" sz="1400" baseline="0" dirty="0" smtClean="0"/>
-              <a:t>Show </a:t>
-            </a:r>
-            <a:r>
-              <a:rPr lang="en-US" sz="1400" b="1" baseline="0" dirty="0" err="1" smtClean="0"/>
-              <a:t>RouteProvider</a:t>
+              <a:t>With my current architecture - every controller will need an </a:t>
+            </a:r>
+            <a:r>
+              <a:rPr lang="en-US" sz="1400" baseline="0" dirty="0" err="1" smtClean="0"/>
+              <a:t>ILoggingService</a:t>
             </a:r>
             <a:r>
               <a:rPr lang="en-US" sz="1400" baseline="0" dirty="0" smtClean="0"/>
-              <a:t> and how controller project is handled with routing </a:t>
-            </a:r>
-            <a:r>
-              <a:rPr lang="en-US" sz="1400" b="1" baseline="0" dirty="0" smtClean="0"/>
-              <a:t>[namespace]</a:t>
+              <a:t> and an I[controller name]Service</a:t>
             </a:r>
           </a:p>
           <a:p>
@@ -4742,10 +4782,29 @@
               <a:buChar char="-"/>
             </a:pPr>
             <a:r>
-              <a:rPr lang="en-US" sz="1400" baseline="0" dirty="0" err="1" smtClean="0"/>
-              <a:t>CustomerController</a:t>
-            </a:r>
-            <a:endParaRPr lang="en-US" sz="1400" baseline="0" dirty="0" smtClean="0"/>
+              <a:rPr lang="en-US" sz="1400" baseline="0" dirty="0" smtClean="0"/>
+              <a:t>I am using StructureMap as my IoC Container, but that requires me to wire up my dependencies one by one</a:t>
+            </a:r>
+          </a:p>
+          <a:p>
+            <a:pPr marL="1200150" lvl="2" indent="-285750" algn="l">
+              <a:buFontTx/>
+              <a:buChar char="-"/>
+            </a:pPr>
+            <a:r>
+              <a:rPr lang="en-US" sz="1400" baseline="0" dirty="0" smtClean="0"/>
+              <a:t>What if there was a way to not have to wire up the dependencies manually for each controller?</a:t>
+            </a:r>
+          </a:p>
+          <a:p>
+            <a:pPr marL="1200150" lvl="2" indent="-285750" algn="l">
+              <a:buFontTx/>
+              <a:buChar char="-"/>
+            </a:pPr>
+            <a:r>
+              <a:rPr lang="en-US" sz="1400" baseline="0" dirty="0" smtClean="0"/>
+              <a:t>Custom Controller Factory</a:t>
+            </a:r>
           </a:p>
           <a:p>
             <a:pPr marL="1657350" lvl="3" indent="-285750" algn="l">
@@ -4754,15 +4813,7 @@
             </a:pPr>
             <a:r>
               <a:rPr lang="en-US" sz="1400" baseline="0" dirty="0" smtClean="0"/>
-              <a:t>With my current architecture - every controller will need an </a:t>
-            </a:r>
-            <a:r>
-              <a:rPr lang="en-US" sz="1400" baseline="0" dirty="0" err="1" smtClean="0"/>
-              <a:t>ILoggingService</a:t>
-            </a:r>
-            <a:r>
-              <a:rPr lang="en-US" sz="1400" baseline="0" dirty="0" smtClean="0"/>
-              <a:t> and an I[controller name]Service</a:t>
+              <a:t>Out of the box the default controller factory just resolves controllers using the default naming convention</a:t>
             </a:r>
           </a:p>
           <a:p>
@@ -4772,7 +4823,7 @@
             </a:pPr>
             <a:r>
               <a:rPr lang="en-US" sz="1400" baseline="0" dirty="0" smtClean="0"/>
-              <a:t>I am using StructureMap as my IoC Container, but that requires me to wire up my dependencies one by one</a:t>
+              <a:t>You can create a custom controller factory to add functionality and/or override the default functionality</a:t>
             </a:r>
           </a:p>
           <a:p>
@@ -4782,7 +4833,7 @@
             </a:pPr>
             <a:r>
               <a:rPr lang="en-US" sz="1400" baseline="0" dirty="0" smtClean="0"/>
-              <a:t>What if there was a way to not have to wire up the dependencies manually for each controller?</a:t>
+              <a:t>In this case we are going to pimp out the default controller factory with StructureMap</a:t>
             </a:r>
           </a:p>
           <a:p>
@@ -4791,8 +4842,53 @@
               <a:buChar char="-"/>
             </a:pPr>
             <a:r>
+              <a:rPr lang="en-US" sz="1400" b="0" baseline="0" dirty="0" smtClean="0"/>
+              <a:t>Show </a:t>
+            </a:r>
+            <a:r>
+              <a:rPr lang="en-US" sz="1400" b="1" baseline="0" dirty="0" err="1" smtClean="0"/>
+              <a:t>ControllerFactory</a:t>
+            </a:r>
+            <a:endParaRPr lang="en-US" sz="1400" b="0" baseline="0" dirty="0" smtClean="0"/>
+          </a:p>
+          <a:p>
+            <a:pPr marL="1657350" lvl="3" indent="-285750" algn="l">
+              <a:buFontTx/>
+              <a:buChar char="-"/>
+            </a:pPr>
+            <a:r>
               <a:rPr lang="en-US" sz="1400" baseline="0" dirty="0" smtClean="0"/>
-              <a:t>Custom Controller Factory</a:t>
+              <a:t>Explain </a:t>
+            </a:r>
+            <a:r>
+              <a:rPr lang="en-US" sz="1400" baseline="0" dirty="0" err="1" smtClean="0"/>
+              <a:t>GetControllerInstance</a:t>
+            </a:r>
+            <a:endParaRPr lang="en-US" sz="1400" baseline="0" dirty="0" smtClean="0"/>
+          </a:p>
+          <a:p>
+            <a:pPr marL="1657350" lvl="3" indent="-285750" algn="l">
+              <a:buFontTx/>
+              <a:buChar char="-"/>
+            </a:pPr>
+            <a:r>
+              <a:rPr lang="en-US" sz="1400" baseline="0" dirty="0" smtClean="0"/>
+              <a:t>Show how we are using StructureMap and the </a:t>
+            </a:r>
+            <a:r>
+              <a:rPr lang="en-US" sz="1400" baseline="0" dirty="0" err="1" smtClean="0"/>
+              <a:t>IContainer</a:t>
+            </a:r>
+            <a:endParaRPr lang="en-US" sz="1400" baseline="0" dirty="0" smtClean="0"/>
+          </a:p>
+          <a:p>
+            <a:pPr marL="1657350" lvl="3" indent="-285750" algn="l">
+              <a:buFontTx/>
+              <a:buChar char="-"/>
+            </a:pPr>
+            <a:r>
+              <a:rPr lang="en-US" sz="1400" baseline="0" dirty="0" smtClean="0"/>
+              <a:t>And we need to tell ASP.NET MVC to use the Custom Controller Factory</a:t>
             </a:r>
           </a:p>
           <a:p>
@@ -4801,206 +4897,126 @@
               <a:buChar char="-"/>
             </a:pPr>
             <a:r>
-              <a:rPr lang="en-US" sz="1400" baseline="0" dirty="0" smtClean="0"/>
-              <a:t>Out of the box the default controller factory just resolves controllers using the default naming convention</a:t>
-            </a:r>
-          </a:p>
-          <a:p>
-            <a:pPr marL="2114550" lvl="4" indent="-285750" algn="l">
+              <a:rPr lang="en-US" sz="1400" baseline="0" dirty="0" err="1" smtClean="0"/>
+              <a:t>Global.asax.cs</a:t>
+            </a:r>
+            <a:endParaRPr lang="en-US" sz="1400" baseline="0" dirty="0" smtClean="0"/>
+          </a:p>
+          <a:p>
+            <a:pPr lvl="5"/>
+            <a:r>
+              <a:rPr lang="en-US" sz="1200" b="1" kern="1200" baseline="0" dirty="0" smtClean="0">
+                <a:solidFill>
+                  <a:schemeClr val="tx1"/>
+                </a:solidFill>
+                <a:latin typeface="+mn-lt"/>
+                <a:ea typeface="+mn-ea"/>
+                <a:cs typeface="+mn-cs"/>
+              </a:rPr>
+              <a:t>**** After </a:t>
+            </a:r>
+            <a:r>
+              <a:rPr lang="en-US" sz="1200" b="1" kern="1200" baseline="0" dirty="0" err="1" smtClean="0">
+                <a:solidFill>
+                  <a:schemeClr val="tx1"/>
+                </a:solidFill>
+                <a:latin typeface="+mn-lt"/>
+                <a:ea typeface="+mn-ea"/>
+                <a:cs typeface="+mn-cs"/>
+              </a:rPr>
+              <a:t>WireUpDependencyInjection</a:t>
+            </a:r>
+            <a:r>
+              <a:rPr lang="en-US" sz="1200" b="1" kern="1200" baseline="0" dirty="0" smtClean="0">
+                <a:solidFill>
+                  <a:schemeClr val="tx1"/>
+                </a:solidFill>
+                <a:latin typeface="+mn-lt"/>
+                <a:ea typeface="+mn-ea"/>
+                <a:cs typeface="+mn-cs"/>
+              </a:rPr>
+              <a:t>(); ****</a:t>
+            </a:r>
+          </a:p>
+          <a:p>
+            <a:pPr lvl="5"/>
+            <a:r>
+              <a:rPr lang="en-US" sz="1200" b="1" kern="1200" dirty="0" err="1" smtClean="0">
+                <a:solidFill>
+                  <a:schemeClr val="tx1"/>
+                </a:solidFill>
+                <a:latin typeface="+mn-lt"/>
+                <a:ea typeface="+mn-ea"/>
+                <a:cs typeface="+mn-cs"/>
+              </a:rPr>
+              <a:t>ControllerBuilder.Current.SetControllerFactory</a:t>
+            </a:r>
+            <a:r>
+              <a:rPr lang="en-US" sz="1200" b="1" kern="1200" dirty="0" smtClean="0">
+                <a:solidFill>
+                  <a:schemeClr val="tx1"/>
+                </a:solidFill>
+                <a:latin typeface="+mn-lt"/>
+                <a:ea typeface="+mn-ea"/>
+                <a:cs typeface="+mn-cs"/>
+              </a:rPr>
+              <a:t>(new </a:t>
+            </a:r>
+            <a:r>
+              <a:rPr lang="en-US" sz="1200" b="1" kern="1200" dirty="0" err="1" smtClean="0">
+                <a:solidFill>
+                  <a:schemeClr val="tx1"/>
+                </a:solidFill>
+                <a:latin typeface="+mn-lt"/>
+                <a:ea typeface="+mn-ea"/>
+                <a:cs typeface="+mn-cs"/>
+              </a:rPr>
+              <a:t>ControllerFactory</a:t>
+            </a:r>
+            <a:r>
+              <a:rPr lang="en-US" sz="1200" b="1" kern="1200" dirty="0" smtClean="0">
+                <a:solidFill>
+                  <a:schemeClr val="tx1"/>
+                </a:solidFill>
+                <a:latin typeface="+mn-lt"/>
+                <a:ea typeface="+mn-ea"/>
+                <a:cs typeface="+mn-cs"/>
+              </a:rPr>
+              <a:t>());</a:t>
+            </a:r>
+            <a:endParaRPr lang="en-US" sz="2400" b="1" baseline="0" dirty="0" smtClean="0"/>
+          </a:p>
+          <a:p>
+            <a:pPr marL="1657350" lvl="3" indent="-285750" algn="l">
               <a:buFontTx/>
               <a:buChar char="-"/>
             </a:pPr>
             <a:r>
-              <a:rPr lang="en-US" sz="1400" baseline="0" dirty="0" smtClean="0"/>
-              <a:t>You can create a custom controller factory to add functionality and/or override the default functionality</a:t>
-            </a:r>
-          </a:p>
-          <a:p>
-            <a:pPr marL="2114550" lvl="4" indent="-285750" algn="l">
+              <a:rPr lang="en-US" sz="1400" b="0" baseline="0" dirty="0" err="1" smtClean="0"/>
+              <a:t>CustomerController</a:t>
+            </a:r>
+            <a:r>
+              <a:rPr lang="en-US" sz="1400" b="0" baseline="0" dirty="0" smtClean="0"/>
+              <a:t>: Select default constructor and </a:t>
+            </a:r>
+            <a:r>
+              <a:rPr lang="en-US" sz="1400" b="1" baseline="0" dirty="0" smtClean="0"/>
+              <a:t>tddmvc4</a:t>
+            </a:r>
+            <a:endParaRPr lang="en-US" sz="1400" b="0" baseline="0" dirty="0" smtClean="0"/>
+          </a:p>
+          <a:p>
+            <a:pPr marL="1657350" lvl="3" indent="-285750" algn="l">
               <a:buFontTx/>
               <a:buChar char="-"/>
             </a:pPr>
             <a:r>
               <a:rPr lang="en-US" sz="1400" baseline="0" dirty="0" smtClean="0"/>
-              <a:t>In this case we are going to pimp out the default controller factory with StructureMap</a:t>
-            </a:r>
-          </a:p>
-          <a:p>
-            <a:pPr marL="2114550" lvl="4" indent="-285750" algn="l">
-              <a:buFontTx/>
-              <a:buChar char="-"/>
-            </a:pPr>
-            <a:r>
-              <a:rPr lang="en-US" sz="1400" b="0" baseline="0" dirty="0" smtClean="0"/>
-              <a:t>Show </a:t>
-            </a:r>
-            <a:r>
-              <a:rPr lang="en-US" sz="1400" b="1" baseline="0" dirty="0" err="1" smtClean="0"/>
-              <a:t>ControllerFactory</a:t>
-            </a:r>
-            <a:endParaRPr lang="en-US" sz="1400" b="0" baseline="0" dirty="0" smtClean="0"/>
-          </a:p>
-          <a:p>
-            <a:pPr marL="2114550" lvl="4" indent="-285750" algn="l">
-              <a:buFontTx/>
-              <a:buChar char="-"/>
-            </a:pPr>
-            <a:r>
-              <a:rPr lang="en-US" sz="1400" baseline="0" dirty="0" smtClean="0"/>
-              <a:t>Explain </a:t>
-            </a:r>
-            <a:r>
-              <a:rPr lang="en-US" sz="1400" baseline="0" dirty="0" err="1" smtClean="0"/>
-              <a:t>GetControllerInstance</a:t>
-            </a:r>
-            <a:endParaRPr lang="en-US" sz="1400" baseline="0" dirty="0" smtClean="0"/>
-          </a:p>
-          <a:p>
-            <a:pPr marL="2114550" lvl="4" indent="-285750" algn="l">
-              <a:buFontTx/>
-              <a:buChar char="-"/>
-            </a:pPr>
-            <a:r>
-              <a:rPr lang="en-US" sz="1400" baseline="0" dirty="0" smtClean="0"/>
-              <a:t>Show how we are using StructureMap and the </a:t>
-            </a:r>
-            <a:r>
-              <a:rPr lang="en-US" sz="1400" baseline="0" dirty="0" err="1" smtClean="0"/>
-              <a:t>IContainer</a:t>
-            </a:r>
-            <a:endParaRPr lang="en-US" sz="1400" baseline="0" dirty="0" smtClean="0"/>
-          </a:p>
-          <a:p>
-            <a:pPr marL="2114550" lvl="4" indent="-285750" algn="l">
-              <a:buFontTx/>
-              <a:buChar char="-"/>
-            </a:pPr>
-            <a:r>
-              <a:rPr lang="en-US" sz="1400" baseline="0" dirty="0" smtClean="0"/>
-              <a:t>And we need to tell ASP.NET MVC to use the Custom Controller Factory</a:t>
-            </a:r>
-          </a:p>
-          <a:p>
-            <a:pPr marL="2571750" lvl="5" indent="-285750" algn="l">
-              <a:buFontTx/>
-              <a:buChar char="-"/>
-            </a:pPr>
-            <a:r>
-              <a:rPr lang="en-US" sz="1400" baseline="0" dirty="0" err="1" smtClean="0"/>
-              <a:t>Global.asax.cs</a:t>
-            </a:r>
-            <a:endParaRPr lang="en-US" sz="1400" baseline="0" dirty="0" smtClean="0"/>
-          </a:p>
-          <a:p>
-            <a:pPr lvl="6"/>
-            <a:r>
-              <a:rPr lang="en-US" sz="1200" b="1" kern="1200" baseline="0" dirty="0" smtClean="0">
-                <a:solidFill>
-                  <a:schemeClr val="tx1"/>
-                </a:solidFill>
-                <a:latin typeface="+mn-lt"/>
-                <a:ea typeface="+mn-ea"/>
-                <a:cs typeface="+mn-cs"/>
-              </a:rPr>
-              <a:t>**** After </a:t>
-            </a:r>
-            <a:r>
-              <a:rPr lang="en-US" sz="1200" b="1" kern="1200" baseline="0" dirty="0" err="1" smtClean="0">
-                <a:solidFill>
-                  <a:schemeClr val="tx1"/>
-                </a:solidFill>
-                <a:latin typeface="+mn-lt"/>
-                <a:ea typeface="+mn-ea"/>
-                <a:cs typeface="+mn-cs"/>
-              </a:rPr>
-              <a:t>WireUpDependencyInjection</a:t>
-            </a:r>
-            <a:r>
-              <a:rPr lang="en-US" sz="1200" b="1" kern="1200" baseline="0" dirty="0" smtClean="0">
-                <a:solidFill>
-                  <a:schemeClr val="tx1"/>
-                </a:solidFill>
-                <a:latin typeface="+mn-lt"/>
-                <a:ea typeface="+mn-ea"/>
-                <a:cs typeface="+mn-cs"/>
-              </a:rPr>
-              <a:t>(); ****</a:t>
-            </a:r>
-          </a:p>
-          <a:p>
-            <a:pPr lvl="6"/>
-            <a:r>
-              <a:rPr lang="en-US" sz="1200" b="1" kern="1200" dirty="0" err="1" smtClean="0">
-                <a:solidFill>
-                  <a:schemeClr val="tx1"/>
-                </a:solidFill>
-                <a:latin typeface="+mn-lt"/>
-                <a:ea typeface="+mn-ea"/>
-                <a:cs typeface="+mn-cs"/>
-              </a:rPr>
-              <a:t>ControllerBuilder.Current.SetControllerFactory</a:t>
-            </a:r>
-            <a:r>
-              <a:rPr lang="en-US" sz="1200" b="1" kern="1200" dirty="0" smtClean="0">
-                <a:solidFill>
-                  <a:schemeClr val="tx1"/>
-                </a:solidFill>
-                <a:latin typeface="+mn-lt"/>
-                <a:ea typeface="+mn-ea"/>
-                <a:cs typeface="+mn-cs"/>
-              </a:rPr>
-              <a:t>(new </a:t>
-            </a:r>
-            <a:r>
-              <a:rPr lang="en-US" sz="1200" b="1" kern="1200" dirty="0" err="1" smtClean="0">
-                <a:solidFill>
-                  <a:schemeClr val="tx1"/>
-                </a:solidFill>
-                <a:latin typeface="+mn-lt"/>
-                <a:ea typeface="+mn-ea"/>
-                <a:cs typeface="+mn-cs"/>
-              </a:rPr>
-              <a:t>ControllerFactory</a:t>
-            </a:r>
-            <a:r>
-              <a:rPr lang="en-US" sz="1200" b="1" kern="1200" dirty="0" smtClean="0">
-                <a:solidFill>
-                  <a:schemeClr val="tx1"/>
-                </a:solidFill>
-                <a:latin typeface="+mn-lt"/>
-                <a:ea typeface="+mn-ea"/>
-                <a:cs typeface="+mn-cs"/>
-              </a:rPr>
-              <a:t>());</a:t>
-            </a:r>
-            <a:endParaRPr lang="en-US" sz="2400" b="1" baseline="0" dirty="0" smtClean="0"/>
-          </a:p>
-          <a:p>
-            <a:pPr marL="2114550" lvl="4" indent="-285750" algn="l">
-              <a:buFontTx/>
-              <a:buChar char="-"/>
-            </a:pPr>
-            <a:r>
-              <a:rPr lang="en-US" sz="1400" b="1" baseline="0" dirty="0" smtClean="0"/>
-              <a:t>tddmvc4  </a:t>
-            </a:r>
-            <a:r>
-              <a:rPr lang="en-US" sz="1400" b="0" baseline="0" dirty="0" smtClean="0"/>
-              <a:t>And then change the Customer Controller to accept the 2 dependencies as inputs</a:t>
-            </a:r>
-          </a:p>
-          <a:p>
-            <a:pPr marL="2114550" lvl="4" indent="-285750" algn="l">
-              <a:buFontTx/>
-              <a:buChar char="-"/>
-            </a:pPr>
-            <a:r>
-              <a:rPr lang="en-US" sz="1400" baseline="0" dirty="0" smtClean="0"/>
               <a:t>That’s it the combination of ASP.NET MVC and having a StructureMap container in our Controller Factory allows our controllers to automatically resolve their dependencies!</a:t>
             </a:r>
           </a:p>
           <a:p>
-            <a:pPr marL="2114550" lvl="4" indent="-285750" algn="l">
+            <a:pPr marL="1657350" lvl="3" indent="-285750" algn="l">
               <a:buFontTx/>
               <a:buChar char="-"/>
             </a:pPr>
@@ -5764,7 +5780,11 @@
             </a:pPr>
             <a:r>
               <a:rPr lang="en-US" sz="1400" b="0" i="0" baseline="0" dirty="0" smtClean="0"/>
-              <a:t>Should Assertion Library – user readable assertions</a:t>
+              <a:t>Fluent Assertions </a:t>
+            </a:r>
+            <a:r>
+              <a:rPr lang="en-US" sz="1400" b="0" i="0" baseline="0" dirty="0" smtClean="0"/>
+              <a:t>Library – user readable assertions</a:t>
             </a:r>
           </a:p>
           <a:p>
@@ -5773,21 +5793,55 @@
               <a:buChar char="-"/>
             </a:pPr>
             <a:r>
+              <a:rPr lang="en-US" dirty="0" smtClean="0"/>
+              <a:t> </a:t>
+            </a:r>
+            <a:r>
               <a:rPr lang="en-US" sz="1200" b="1" kern="1200" dirty="0" err="1" smtClean="0">
                 <a:solidFill>
                   <a:schemeClr val="tx1"/>
                 </a:solidFill>
-                <a:latin typeface="+mn-lt"/>
-                <a:ea typeface="+mn-ea"/>
-                <a:cs typeface="+mn-cs"/>
-              </a:rPr>
-              <a:t>result.Model.ShouldBeType</a:t>
+                <a:effectLst/>
+                <a:latin typeface="+mn-lt"/>
+                <a:ea typeface="+mn-ea"/>
+                <a:cs typeface="+mn-cs"/>
+              </a:rPr>
+              <a:t>result.Model.Should</a:t>
+            </a:r>
+            <a:r>
+              <a:rPr lang="en-US" b="1" dirty="0" smtClean="0"/>
+              <a:t>()</a:t>
             </a:r>
             <a:r>
               <a:rPr lang="en-US" sz="1200" b="1" kern="1200" dirty="0" smtClean="0">
                 <a:solidFill>
                   <a:schemeClr val="tx1"/>
                 </a:solidFill>
+                <a:effectLst/>
+                <a:latin typeface="+mn-lt"/>
+                <a:ea typeface="+mn-ea"/>
+                <a:cs typeface="+mn-cs"/>
+              </a:rPr>
+              <a:t>.</a:t>
+            </a:r>
+            <a:r>
+              <a:rPr lang="en-US" sz="1200" b="1" kern="1200" dirty="0" err="1" smtClean="0">
+                <a:solidFill>
+                  <a:schemeClr val="tx1"/>
+                </a:solidFill>
+                <a:effectLst/>
+                <a:latin typeface="+mn-lt"/>
+                <a:ea typeface="+mn-ea"/>
+                <a:cs typeface="+mn-cs"/>
+              </a:rPr>
+              <a:t>BeOfType</a:t>
+            </a:r>
+            <a:r>
+              <a:rPr lang="en-US" sz="1200" b="1" kern="1200" dirty="0" smtClean="0">
+                <a:solidFill>
+                  <a:schemeClr val="tx1"/>
+                </a:solidFill>
+                <a:effectLst/>
                 <a:latin typeface="+mn-lt"/>
                 <a:ea typeface="+mn-ea"/>
                 <a:cs typeface="+mn-cs"/>
@@ -5799,23 +5853,41 @@
                 <a:solidFill>
                   <a:schemeClr val="tx1"/>
                 </a:solidFill>
-                <a:latin typeface="+mn-lt"/>
-                <a:ea typeface="+mn-ea"/>
-                <a:cs typeface="+mn-cs"/>
-              </a:rPr>
-              <a:t>Common.Domain.Customer</a:t>
+                <a:effectLst/>
+                <a:latin typeface="+mn-lt"/>
+                <a:ea typeface="+mn-ea"/>
+                <a:cs typeface="+mn-cs"/>
+              </a:rPr>
+              <a:t>Core.Entities.Customer</a:t>
             </a:r>
             <a:r>
               <a:rPr lang="en-US" sz="1200" b="1" kern="1200" dirty="0" smtClean="0">
                 <a:solidFill>
                   <a:schemeClr val="tx1"/>
                 </a:solidFill>
-                <a:latin typeface="+mn-lt"/>
-                <a:ea typeface="+mn-ea"/>
-                <a:cs typeface="+mn-cs"/>
-              </a:rPr>
-              <a:t>&gt;();</a:t>
-            </a:r>
+                <a:effectLst/>
+                <a:latin typeface="+mn-lt"/>
+                <a:ea typeface="+mn-ea"/>
+                <a:cs typeface="+mn-cs"/>
+              </a:rPr>
+              <a:t>&gt;</a:t>
+            </a:r>
+            <a:r>
+              <a:rPr lang="en-US" b="1" dirty="0" smtClean="0"/>
+              <a:t>();</a:t>
+            </a:r>
+            <a:r>
+              <a:rPr lang="en-US" dirty="0" smtClean="0"/>
+              <a:t> </a:t>
+            </a:r>
+            <a:endParaRPr lang="en-US" sz="1200" b="1" kern="1200" dirty="0" smtClean="0">
+              <a:solidFill>
+                <a:schemeClr val="tx1"/>
+              </a:solidFill>
+              <a:latin typeface="+mn-lt"/>
+              <a:ea typeface="+mn-ea"/>
+              <a:cs typeface="+mn-cs"/>
+            </a:endParaRPr>
           </a:p>
           <a:p>
             <a:pPr marL="742950" lvl="1" indent="-285750" algn="l">
@@ -5850,6 +5922,14 @@
               </a:rPr>
               <a:t>tddmvc7</a:t>
             </a:r>
+            <a:endParaRPr lang="en-US" sz="1200" b="1" kern="1200" dirty="0" smtClean="0">
+              <a:solidFill>
+                <a:schemeClr val="tx1"/>
+              </a:solidFill>
+              <a:latin typeface="+mn-lt"/>
+              <a:ea typeface="+mn-ea"/>
+              <a:cs typeface="+mn-cs"/>
+            </a:endParaRPr>
           </a:p>
           <a:p>
             <a:r>
@@ -6381,49 +6461,87 @@
             <a:prstTxWarp prst="textNoShape">
               <a:avLst/>
             </a:prstTxWarp>
+            <a:normAutofit fontScale="92500"/>
           </a:bodyPr>
           <a:lstStyle/>
           <a:p>
-            <a:pPr eaLnBrk="1" hangingPunct="1">
-              <a:spcBef>
-                <a:spcPct val="0"/>
-              </a:spcBef>
-            </a:pPr>
-            <a:r>
-              <a:rPr lang="en-US" dirty="0" smtClean="0"/>
-              <a:t>Allows you to enter text in input fields, click radio buttons, submit</a:t>
-            </a:r>
-            <a:r>
-              <a:rPr lang="en-US" baseline="0" dirty="0" smtClean="0"/>
-              <a:t> forms, click links, etc.</a:t>
-            </a:r>
-          </a:p>
-          <a:p>
-            <a:pPr eaLnBrk="1" hangingPunct="1">
-              <a:spcBef>
-                <a:spcPct val="0"/>
-              </a:spcBef>
-            </a:pPr>
-            <a:endParaRPr lang="en-US" baseline="0" dirty="0" smtClean="0"/>
-          </a:p>
-          <a:p>
-            <a:pPr eaLnBrk="1" hangingPunct="1">
-              <a:spcBef>
-                <a:spcPct val="0"/>
-              </a:spcBef>
-            </a:pPr>
-            <a:r>
-              <a:rPr lang="en-US" baseline="0" dirty="0" smtClean="0"/>
-              <a:t>** Important to note this is not an end to end UI testing solution…it is for testing the UI at a unit level</a:t>
-            </a:r>
-          </a:p>
-          <a:p>
-            <a:pPr eaLnBrk="1" hangingPunct="1">
-              <a:spcBef>
-                <a:spcPct val="0"/>
-              </a:spcBef>
-            </a:pPr>
-            <a:endParaRPr lang="en-US" dirty="0" smtClean="0"/>
+            <a:r>
+              <a:rPr lang="en-US" sz="2400" dirty="0" smtClean="0"/>
+              <a:t>Automate the browser from your tests</a:t>
+            </a:r>
+          </a:p>
+          <a:p>
+            <a:r>
+              <a:rPr lang="en-US" sz="2400" dirty="0" smtClean="0"/>
+              <a:t>Supports IE and </a:t>
+            </a:r>
+            <a:r>
+              <a:rPr lang="en-US" sz="2400" dirty="0" err="1" smtClean="0"/>
+              <a:t>FireFox</a:t>
+            </a:r>
+            <a:endParaRPr lang="en-US" sz="2400" dirty="0" smtClean="0"/>
+          </a:p>
+          <a:p>
+            <a:r>
+              <a:rPr lang="en-US" sz="2400" dirty="0" smtClean="0"/>
+              <a:t>Allows you test</a:t>
+            </a:r>
+          </a:p>
+          <a:p>
+            <a:pPr lvl="1"/>
+            <a:r>
+              <a:rPr lang="en-US" sz="2100" dirty="0" smtClean="0"/>
+              <a:t>Navigation</a:t>
+            </a:r>
+          </a:p>
+          <a:p>
+            <a:pPr lvl="1"/>
+            <a:r>
+              <a:rPr lang="en-US" sz="2100" dirty="0" smtClean="0"/>
+              <a:t>Display logic (visible, </a:t>
+            </a:r>
+            <a:r>
+              <a:rPr lang="en-US" sz="2100" dirty="0" err="1" smtClean="0"/>
+              <a:t>etc</a:t>
+            </a:r>
+            <a:r>
+              <a:rPr lang="en-US" sz="2100" dirty="0" smtClean="0"/>
+              <a:t>)</a:t>
+            </a:r>
+          </a:p>
+          <a:p>
+            <a:pPr lvl="1"/>
+            <a:r>
+              <a:rPr lang="en-US" sz="2100" dirty="0" smtClean="0"/>
+              <a:t>Dialogs</a:t>
+            </a:r>
+          </a:p>
+          <a:p>
+            <a:r>
+              <a:rPr lang="en-US" sz="2400" dirty="0" smtClean="0"/>
+              <a:t>Free</a:t>
+            </a:r>
+          </a:p>
+          <a:p>
+            <a:endParaRPr lang="en-US" sz="2400" dirty="0" smtClean="0"/>
+          </a:p>
+          <a:p>
+            <a:endParaRPr lang="en-US" sz="2400" dirty="0" smtClean="0"/>
+          </a:p>
+          <a:p>
+            <a:r>
+              <a:rPr lang="en-US" sz="2400" dirty="0" smtClean="0"/>
+              <a:t>*Not meant to be an end to end solution</a:t>
+            </a:r>
+            <a:endParaRPr lang="en-US" sz="2100" dirty="0" smtClean="0"/>
+          </a:p>
+          <a:p>
+            <a:pPr lvl="1"/>
+            <a:endParaRPr lang="en-US" sz="2100" smtClean="0"/>
+          </a:p>
+          <a:p>
+            <a:pPr lvl="1"/>
+            <a:endParaRPr lang="en-US" sz="2100" dirty="0"/>
           </a:p>
         </p:txBody>
       </p:sp>
@@ -6536,6 +6654,7 @@
             <a:prstTxWarp prst="textNoShape">
               <a:avLst/>
             </a:prstTxWarp>
+            <a:normAutofit fontScale="25000" lnSpcReduction="20000"/>
           </a:bodyPr>
           <a:lstStyle/>
           <a:p>
@@ -8908,7 +9027,7 @@
             <a:prstTxWarp prst="textNoShape">
               <a:avLst/>
             </a:prstTxWarp>
-            <a:normAutofit lnSpcReduction="10000"/>
+            <a:normAutofit/>
           </a:bodyPr>
           <a:lstStyle/>
           <a:p>
@@ -16160,183 +16279,6 @@
           <a:chExt cx="0" cy="0"/>
         </a:xfrm>
       </p:grpSpPr>
-      <p:sp>
-        <p:nvSpPr>
-          <p:cNvPr id="17" name="Title 5"/>
-          <p:cNvSpPr txBox="1">
-            <a:spLocks/>
-          </p:cNvSpPr>
-          <p:nvPr/>
-        </p:nvSpPr>
-        <p:spPr bwMode="auto">
-          <a:xfrm>
-            <a:off x="374650" y="595313"/>
-            <a:ext cx="8761413" cy="838200"/>
-          </a:xfrm>
-          <a:prstGeom prst="rect">
-            <a:avLst/>
-          </a:prstGeom>
-          <a:noFill/>
-          <a:ln w="9525">
-            <a:noFill/>
-            <a:miter lim="800000"/>
-            <a:headEnd/>
-            <a:tailEnd/>
-          </a:ln>
-        </p:spPr>
-        <p:txBody>
-          <a:bodyPr vert="horz" wrap="square" lIns="96646" tIns="48323" rIns="96646" bIns="48323" numCol="1" anchor="ctr" anchorCtr="0" compatLnSpc="1">
-            <a:prstTxWarp prst="textNoShape">
-              <a:avLst/>
-            </a:prstTxWarp>
-          </a:bodyPr>
-          <a:lstStyle>
-            <a:lvl1pPr algn="l" defTabSz="966788" rtl="0" eaLnBrk="1" fontAlgn="base" hangingPunct="1">
-              <a:spcBef>
-                <a:spcPct val="0"/>
-              </a:spcBef>
-              <a:spcAft>
-                <a:spcPct val="0"/>
-              </a:spcAft>
-              <a:defRPr sz="3400">
-                <a:solidFill>
-                  <a:srgbClr val="0066CC"/>
-                </a:solidFill>
-                <a:latin typeface="+mj-lt"/>
-                <a:ea typeface="+mj-ea"/>
-                <a:cs typeface="+mj-cs"/>
-              </a:defRPr>
-            </a:lvl1pPr>
-            <a:lvl2pPr algn="l" defTabSz="966788" rtl="0" eaLnBrk="1" fontAlgn="base" hangingPunct="1">
-              <a:spcBef>
-                <a:spcPct val="0"/>
-              </a:spcBef>
-              <a:spcAft>
-                <a:spcPct val="0"/>
-              </a:spcAft>
-              <a:defRPr sz="3400">
-                <a:solidFill>
-                  <a:srgbClr val="0066CC"/>
-                </a:solidFill>
-                <a:latin typeface="Arial" charset="0"/>
-              </a:defRPr>
-            </a:lvl2pPr>
-            <a:lvl3pPr algn="l" defTabSz="966788" rtl="0" eaLnBrk="1" fontAlgn="base" hangingPunct="1">
-              <a:spcBef>
-                <a:spcPct val="0"/>
-              </a:spcBef>
-              <a:spcAft>
-                <a:spcPct val="0"/>
-              </a:spcAft>
-              <a:defRPr sz="3400">
-                <a:solidFill>
-                  <a:srgbClr val="0066CC"/>
-                </a:solidFill>
-                <a:latin typeface="Arial" charset="0"/>
-              </a:defRPr>
-            </a:lvl3pPr>
-            <a:lvl4pPr algn="l" defTabSz="966788" rtl="0" eaLnBrk="1" fontAlgn="base" hangingPunct="1">
-              <a:spcBef>
-                <a:spcPct val="0"/>
-              </a:spcBef>
-              <a:spcAft>
-                <a:spcPct val="0"/>
-              </a:spcAft>
-              <a:defRPr sz="3400">
-                <a:solidFill>
-                  <a:srgbClr val="0066CC"/>
-                </a:solidFill>
-                <a:latin typeface="Arial" charset="0"/>
-              </a:defRPr>
-            </a:lvl4pPr>
-            <a:lvl5pPr algn="l" defTabSz="966788" rtl="0" eaLnBrk="1" fontAlgn="base" hangingPunct="1">
-              <a:spcBef>
-                <a:spcPct val="0"/>
-              </a:spcBef>
-              <a:spcAft>
-                <a:spcPct val="0"/>
-              </a:spcAft>
-              <a:defRPr sz="3400">
-                <a:solidFill>
-                  <a:srgbClr val="0066CC"/>
-                </a:solidFill>
-                <a:latin typeface="Arial" charset="0"/>
-              </a:defRPr>
-            </a:lvl5pPr>
-            <a:lvl6pPr marL="457200" algn="l" defTabSz="966788" rtl="0" eaLnBrk="1" fontAlgn="base" hangingPunct="1">
-              <a:spcBef>
-                <a:spcPct val="0"/>
-              </a:spcBef>
-              <a:spcAft>
-                <a:spcPct val="0"/>
-              </a:spcAft>
-              <a:defRPr sz="3400">
-                <a:solidFill>
-                  <a:srgbClr val="0066CC"/>
-                </a:solidFill>
-                <a:latin typeface="Arial" charset="0"/>
-              </a:defRPr>
-            </a:lvl6pPr>
-            <a:lvl7pPr marL="914400" algn="l" defTabSz="966788" rtl="0" eaLnBrk="1" fontAlgn="base" hangingPunct="1">
-              <a:spcBef>
-                <a:spcPct val="0"/>
-              </a:spcBef>
-              <a:spcAft>
-                <a:spcPct val="0"/>
-              </a:spcAft>
-              <a:defRPr sz="3400">
-                <a:solidFill>
-                  <a:srgbClr val="0066CC"/>
-                </a:solidFill>
-                <a:latin typeface="Arial" charset="0"/>
-              </a:defRPr>
-            </a:lvl7pPr>
-            <a:lvl8pPr marL="1371600" algn="l" defTabSz="966788" rtl="0" eaLnBrk="1" fontAlgn="base" hangingPunct="1">
-              <a:spcBef>
-                <a:spcPct val="0"/>
-              </a:spcBef>
-              <a:spcAft>
-                <a:spcPct val="0"/>
-              </a:spcAft>
-              <a:defRPr sz="3400">
-                <a:solidFill>
-                  <a:srgbClr val="0066CC"/>
-                </a:solidFill>
-                <a:latin typeface="Arial" charset="0"/>
-              </a:defRPr>
-            </a:lvl8pPr>
-            <a:lvl9pPr marL="1828800" algn="l" defTabSz="966788" rtl="0" eaLnBrk="1" fontAlgn="base" hangingPunct="1">
-              <a:spcBef>
-                <a:spcPct val="0"/>
-              </a:spcBef>
-              <a:spcAft>
-                <a:spcPct val="0"/>
-              </a:spcAft>
-              <a:defRPr sz="3400">
-                <a:solidFill>
-                  <a:srgbClr val="0066CC"/>
-                </a:solidFill>
-                <a:latin typeface="Arial" charset="0"/>
-              </a:defRPr>
-            </a:lvl9pPr>
-          </a:lstStyle>
-          <a:p>
-            <a:r>
-              <a:rPr lang="en-US" sz="4690" dirty="0" err="1">
-                <a:solidFill>
-                  <a:schemeClr val="tx1"/>
-                </a:solidFill>
-              </a:rPr>
-              <a:t>MvcContrib</a:t>
-            </a:r>
-            <a:endParaRPr lang="en-US" sz="4690" dirty="0">
-              <a:solidFill>
-                <a:schemeClr val="tx1"/>
-              </a:solidFill>
-            </a:endParaRPr>
-          </a:p>
-        </p:txBody>
-      </p:sp>
       <p:pic>
         <p:nvPicPr>
           <p:cNvPr id="6" name="Picture 4" descr="http://www.hanselman.com/blog/content/binary/WindowsLiveWriter/Hanselmi.NETMVCContribwithJeffreyPalermo_50A/image_bdb4cae8-bcac-465d-acb1-52aa5b5ed606.png"/>
@@ -16360,7 +16302,7 @@
         </p:blipFill>
         <p:spPr bwMode="auto">
           <a:xfrm>
-            <a:off x="6316663" y="5236618"/>
+            <a:off x="1578409" y="1662145"/>
             <a:ext cx="2819400" cy="962025"/>
           </a:xfrm>
           <a:prstGeom prst="rect">
@@ -16378,213 +16320,6 @@
           </a:extLst>
         </p:spPr>
       </p:pic>
-      <p:sp>
-        <p:nvSpPr>
-          <p:cNvPr id="7" name="Rectangle 3"/>
-          <p:cNvSpPr txBox="1">
-            <a:spLocks noChangeArrowheads="1"/>
-          </p:cNvSpPr>
-          <p:nvPr/>
-        </p:nvSpPr>
-        <p:spPr bwMode="auto">
-          <a:xfrm>
-            <a:off x="472474" y="1484315"/>
-            <a:ext cx="8159750" cy="4770437"/>
-          </a:xfrm>
-          <a:prstGeom prst="rect">
-            <a:avLst/>
-          </a:prstGeom>
-          <a:noFill/>
-          <a:ln w="9525">
-            <a:noFill/>
-            <a:miter lim="800000"/>
-            <a:headEnd/>
-            <a:tailEnd/>
-          </a:ln>
-        </p:spPr>
-        <p:txBody>
-          <a:bodyPr vert="horz" wrap="square" lIns="96646" tIns="48323" rIns="96646" bIns="48323" numCol="1" anchor="t" anchorCtr="0" compatLnSpc="1">
-            <a:prstTxWarp prst="textNoShape">
-              <a:avLst/>
-            </a:prstTxWarp>
-          </a:bodyPr>
-          <a:lstStyle>
-            <a:lvl1pPr marL="363538" indent="-363538" algn="l" defTabSz="966788" rtl="0" eaLnBrk="1" fontAlgn="base" hangingPunct="1">
-              <a:spcBef>
-                <a:spcPct val="20000"/>
-              </a:spcBef>
-              <a:spcAft>
-                <a:spcPct val="0"/>
-              </a:spcAft>
-              <a:buChar char="•"/>
-              <a:defRPr sz="2900">
-                <a:solidFill>
-                  <a:schemeClr val="tx1"/>
-                </a:solidFill>
-                <a:latin typeface="+mn-lt"/>
-                <a:ea typeface="+mn-ea"/>
-                <a:cs typeface="+mn-cs"/>
-              </a:defRPr>
-            </a:lvl1pPr>
-            <a:lvl2pPr marL="784225" indent="-301625" algn="l" defTabSz="966788" rtl="0" eaLnBrk="1" fontAlgn="base" hangingPunct="1">
-              <a:spcBef>
-                <a:spcPct val="20000"/>
-              </a:spcBef>
-              <a:spcAft>
-                <a:spcPct val="0"/>
-              </a:spcAft>
-              <a:buChar char="–"/>
-              <a:defRPr sz="2600">
-                <a:solidFill>
-                  <a:schemeClr val="tx1"/>
-                </a:solidFill>
-                <a:latin typeface="+mn-lt"/>
-              </a:defRPr>
-            </a:lvl2pPr>
-            <a:lvl3pPr marL="1208088" indent="-241300" algn="l" defTabSz="966788" rtl="0" eaLnBrk="1" fontAlgn="base" hangingPunct="1">
-              <a:spcBef>
-                <a:spcPct val="20000"/>
-              </a:spcBef>
-              <a:spcAft>
-                <a:spcPct val="0"/>
-              </a:spcAft>
-              <a:buChar char="•"/>
-              <a:defRPr sz="2100">
-                <a:solidFill>
-                  <a:schemeClr val="tx1"/>
-                </a:solidFill>
-                <a:latin typeface="+mn-lt"/>
-              </a:defRPr>
-            </a:lvl3pPr>
-            <a:lvl4pPr marL="1689100" indent="-238125" algn="l" defTabSz="966788" rtl="0" eaLnBrk="1" fontAlgn="base" hangingPunct="1">
-              <a:spcBef>
-                <a:spcPct val="20000"/>
-              </a:spcBef>
-              <a:spcAft>
-                <a:spcPct val="0"/>
-              </a:spcAft>
-              <a:buChar char="–"/>
-              <a:defRPr sz="2100">
-                <a:solidFill>
-                  <a:schemeClr val="tx1"/>
-                </a:solidFill>
-                <a:latin typeface="+mn-lt"/>
-              </a:defRPr>
-            </a:lvl4pPr>
-            <a:lvl5pPr marL="2174875" indent="-241300" algn="l" defTabSz="966788" rtl="0" eaLnBrk="1" fontAlgn="base" hangingPunct="1">
-              <a:spcBef>
-                <a:spcPct val="20000"/>
-              </a:spcBef>
-              <a:spcAft>
-                <a:spcPct val="0"/>
-              </a:spcAft>
-              <a:buChar char="»"/>
-              <a:defRPr sz="2100">
-                <a:solidFill>
-                  <a:schemeClr val="tx1"/>
-                </a:solidFill>
-                <a:latin typeface="+mn-lt"/>
-              </a:defRPr>
-            </a:lvl5pPr>
-            <a:lvl6pPr marL="2632075" indent="-241300" algn="l" defTabSz="966788" rtl="0" eaLnBrk="1" fontAlgn="base" hangingPunct="1">
-              <a:spcBef>
-                <a:spcPct val="20000"/>
-              </a:spcBef>
-              <a:spcAft>
-                <a:spcPct val="0"/>
-              </a:spcAft>
-              <a:buChar char="»"/>
-              <a:defRPr sz="2100">
-                <a:solidFill>
-                  <a:schemeClr val="tx1"/>
-                </a:solidFill>
-                <a:latin typeface="+mn-lt"/>
-              </a:defRPr>
-            </a:lvl6pPr>
-            <a:lvl7pPr marL="3089275" indent="-241300" algn="l" defTabSz="966788" rtl="0" eaLnBrk="1" fontAlgn="base" hangingPunct="1">
-              <a:spcBef>
-                <a:spcPct val="20000"/>
-              </a:spcBef>
-              <a:spcAft>
-                <a:spcPct val="0"/>
-              </a:spcAft>
-              <a:buChar char="»"/>
-              <a:defRPr sz="2100">
-                <a:solidFill>
-                  <a:schemeClr val="tx1"/>
-                </a:solidFill>
-                <a:latin typeface="+mn-lt"/>
-              </a:defRPr>
-            </a:lvl7pPr>
-            <a:lvl8pPr marL="3546475" indent="-241300" algn="l" defTabSz="966788" rtl="0" eaLnBrk="1" fontAlgn="base" hangingPunct="1">
-              <a:spcBef>
-                <a:spcPct val="20000"/>
-              </a:spcBef>
-              <a:spcAft>
-                <a:spcPct val="0"/>
-              </a:spcAft>
-              <a:buChar char="»"/>
-              <a:defRPr sz="2100">
-                <a:solidFill>
-                  <a:schemeClr val="tx1"/>
-                </a:solidFill>
-                <a:latin typeface="+mn-lt"/>
-              </a:defRPr>
-            </a:lvl8pPr>
-            <a:lvl9pPr marL="4003675" indent="-241300" algn="l" defTabSz="966788" rtl="0" eaLnBrk="1" fontAlgn="base" hangingPunct="1">
-              <a:spcBef>
-                <a:spcPct val="20000"/>
-              </a:spcBef>
-              <a:spcAft>
-                <a:spcPct val="0"/>
-              </a:spcAft>
-              <a:buChar char="»"/>
-              <a:defRPr sz="2100">
-                <a:solidFill>
-                  <a:schemeClr val="tx1"/>
-                </a:solidFill>
-                <a:latin typeface="+mn-lt"/>
-              </a:defRPr>
-            </a:lvl9pPr>
-          </a:lstStyle>
-          <a:p>
-            <a:r>
-              <a:rPr lang="en-US" sz="2400" dirty="0" err="1"/>
-              <a:t>CodePlex</a:t>
-            </a:r>
-            <a:r>
-              <a:rPr lang="en-US" sz="2400" dirty="0"/>
-              <a:t> project</a:t>
-            </a:r>
-          </a:p>
-          <a:p>
-            <a:r>
-              <a:rPr lang="en-US" sz="2400" dirty="0"/>
-              <a:t>Designed to add additional functionality</a:t>
-            </a:r>
-          </a:p>
-          <a:p>
-            <a:r>
-              <a:rPr lang="en-US" sz="2400" dirty="0" err="1"/>
-              <a:t>MvcContrib.TestHelper</a:t>
-            </a:r>
-            <a:endParaRPr lang="en-US" sz="2400" dirty="0"/>
-          </a:p>
-          <a:p>
-            <a:r>
-              <a:rPr lang="en-US" sz="2400" dirty="0">
-                <a:hlinkClick r:id="rId4"/>
-              </a:rPr>
-              <a:t>http://www.MvcContrib.CodePlex.com</a:t>
-            </a:r>
-            <a:endParaRPr lang="en-US" sz="2100" dirty="0"/>
-          </a:p>
-          <a:p>
-            <a:pPr lvl="1"/>
-            <a:endParaRPr lang="en-US" sz="2100" dirty="0"/>
-          </a:p>
-        </p:txBody>
-      </p:sp>
     </p:spTree>
     <p:extLst>
       <p:ext uri="{BB962C8B-B14F-4D97-AF65-F5344CB8AC3E}">
@@ -17069,204 +16804,6 @@
               </a:rPr>
               <a:t>Routing</a:t>
             </a:r>
-          </a:p>
-        </p:txBody>
-      </p:sp>
-      <p:sp>
-        <p:nvSpPr>
-          <p:cNvPr id="27" name="Rectangle 3"/>
-          <p:cNvSpPr txBox="1">
-            <a:spLocks noChangeArrowheads="1"/>
-          </p:cNvSpPr>
-          <p:nvPr/>
-        </p:nvSpPr>
-        <p:spPr bwMode="auto">
-          <a:xfrm>
-            <a:off x="460765" y="1484315"/>
-            <a:ext cx="8159750" cy="4770437"/>
-          </a:xfrm>
-          <a:prstGeom prst="rect">
-            <a:avLst/>
-          </a:prstGeom>
-          <a:noFill/>
-          <a:ln w="9525">
-            <a:noFill/>
-            <a:miter lim="800000"/>
-            <a:headEnd/>
-            <a:tailEnd/>
-          </a:ln>
-        </p:spPr>
-        <p:txBody>
-          <a:bodyPr vert="horz" wrap="square" lIns="96646" tIns="48323" rIns="96646" bIns="48323" numCol="1" anchor="t" anchorCtr="0" compatLnSpc="1">
-            <a:prstTxWarp prst="textNoShape">
-              <a:avLst/>
-            </a:prstTxWarp>
-          </a:bodyPr>
-          <a:lstStyle>
-            <a:lvl1pPr marL="363538" indent="-363538" algn="l" defTabSz="966788" rtl="0" eaLnBrk="1" fontAlgn="base" hangingPunct="1">
-              <a:spcBef>
-                <a:spcPct val="20000"/>
-              </a:spcBef>
-              <a:spcAft>
-                <a:spcPct val="0"/>
-              </a:spcAft>
-              <a:buChar char="•"/>
-              <a:defRPr sz="2900">
-                <a:solidFill>
-                  <a:schemeClr val="tx1"/>
-                </a:solidFill>
-                <a:latin typeface="+mn-lt"/>
-                <a:ea typeface="+mn-ea"/>
-                <a:cs typeface="+mn-cs"/>
-              </a:defRPr>
-            </a:lvl1pPr>
-            <a:lvl2pPr marL="784225" indent="-301625" algn="l" defTabSz="966788" rtl="0" eaLnBrk="1" fontAlgn="base" hangingPunct="1">
-              <a:spcBef>
-                <a:spcPct val="20000"/>
-              </a:spcBef>
-              <a:spcAft>
-                <a:spcPct val="0"/>
-              </a:spcAft>
-              <a:buChar char="–"/>
-              <a:defRPr sz="2600">
-                <a:solidFill>
-                  <a:schemeClr val="tx1"/>
-                </a:solidFill>
-                <a:latin typeface="+mn-lt"/>
-              </a:defRPr>
-            </a:lvl2pPr>
-            <a:lvl3pPr marL="1208088" indent="-241300" algn="l" defTabSz="966788" rtl="0" eaLnBrk="1" fontAlgn="base" hangingPunct="1">
-              <a:spcBef>
-                <a:spcPct val="20000"/>
-              </a:spcBef>
-              <a:spcAft>
-                <a:spcPct val="0"/>
-              </a:spcAft>
-              <a:buChar char="•"/>
-              <a:defRPr sz="2100">
-                <a:solidFill>
-                  <a:schemeClr val="tx1"/>
-                </a:solidFill>
-                <a:latin typeface="+mn-lt"/>
-              </a:defRPr>
-            </a:lvl3pPr>
-            <a:lvl4pPr marL="1689100" indent="-238125" algn="l" defTabSz="966788" rtl="0" eaLnBrk="1" fontAlgn="base" hangingPunct="1">
-              <a:spcBef>
-                <a:spcPct val="20000"/>
-              </a:spcBef>
-              <a:spcAft>
-                <a:spcPct val="0"/>
-              </a:spcAft>
-              <a:buChar char="–"/>
-              <a:defRPr sz="2100">
-                <a:solidFill>
-                  <a:schemeClr val="tx1"/>
-                </a:solidFill>
-                <a:latin typeface="+mn-lt"/>
-              </a:defRPr>
-            </a:lvl4pPr>
-            <a:lvl5pPr marL="2174875" indent="-241300" algn="l" defTabSz="966788" rtl="0" eaLnBrk="1" fontAlgn="base" hangingPunct="1">
-              <a:spcBef>
-                <a:spcPct val="20000"/>
-              </a:spcBef>
-              <a:spcAft>
-                <a:spcPct val="0"/>
-              </a:spcAft>
-              <a:buChar char="»"/>
-              <a:defRPr sz="2100">
-                <a:solidFill>
-                  <a:schemeClr val="tx1"/>
-                </a:solidFill>
-                <a:latin typeface="+mn-lt"/>
-              </a:defRPr>
-            </a:lvl5pPr>
-            <a:lvl6pPr marL="2632075" indent="-241300" algn="l" defTabSz="966788" rtl="0" eaLnBrk="1" fontAlgn="base" hangingPunct="1">
-              <a:spcBef>
-                <a:spcPct val="20000"/>
-              </a:spcBef>
-              <a:spcAft>
-                <a:spcPct val="0"/>
-              </a:spcAft>
-              <a:buChar char="»"/>
-              <a:defRPr sz="2100">
-                <a:solidFill>
-                  <a:schemeClr val="tx1"/>
-                </a:solidFill>
-                <a:latin typeface="+mn-lt"/>
-              </a:defRPr>
-            </a:lvl6pPr>
-            <a:lvl7pPr marL="3089275" indent="-241300" algn="l" defTabSz="966788" rtl="0" eaLnBrk="1" fontAlgn="base" hangingPunct="1">
-              <a:spcBef>
-                <a:spcPct val="20000"/>
-              </a:spcBef>
-              <a:spcAft>
-                <a:spcPct val="0"/>
-              </a:spcAft>
-              <a:buChar char="»"/>
-              <a:defRPr sz="2100">
-                <a:solidFill>
-                  <a:schemeClr val="tx1"/>
-                </a:solidFill>
-                <a:latin typeface="+mn-lt"/>
-              </a:defRPr>
-            </a:lvl7pPr>
-            <a:lvl8pPr marL="3546475" indent="-241300" algn="l" defTabSz="966788" rtl="0" eaLnBrk="1" fontAlgn="base" hangingPunct="1">
-              <a:spcBef>
-                <a:spcPct val="20000"/>
-              </a:spcBef>
-              <a:spcAft>
-                <a:spcPct val="0"/>
-              </a:spcAft>
-              <a:buChar char="»"/>
-              <a:defRPr sz="2100">
-                <a:solidFill>
-                  <a:schemeClr val="tx1"/>
-                </a:solidFill>
-                <a:latin typeface="+mn-lt"/>
-              </a:defRPr>
-            </a:lvl8pPr>
-            <a:lvl9pPr marL="4003675" indent="-241300" algn="l" defTabSz="966788" rtl="0" eaLnBrk="1" fontAlgn="base" hangingPunct="1">
-              <a:spcBef>
-                <a:spcPct val="20000"/>
-              </a:spcBef>
-              <a:spcAft>
-                <a:spcPct val="0"/>
-              </a:spcAft>
-              <a:buChar char="»"/>
-              <a:defRPr sz="2100">
-                <a:solidFill>
-                  <a:schemeClr val="tx1"/>
-                </a:solidFill>
-                <a:latin typeface="+mn-lt"/>
-              </a:defRPr>
-            </a:lvl9pPr>
-          </a:lstStyle>
-          <a:p>
-            <a:r>
-              <a:rPr lang="en-US" sz="2400" dirty="0"/>
-              <a:t>Handles the incoming request</a:t>
-            </a:r>
-          </a:p>
-          <a:p>
-            <a:r>
-              <a:rPr lang="en-US" sz="2400" dirty="0"/>
-              <a:t>Maps to controller and action</a:t>
-            </a:r>
-          </a:p>
-          <a:p>
-            <a:r>
-              <a:rPr lang="en-US" sz="2400" dirty="0"/>
-              <a:t>Can get crazy complex</a:t>
-            </a:r>
-            <a:endParaRPr lang="en-US" sz="2100" dirty="0"/>
-          </a:p>
-          <a:p>
-            <a:pPr lvl="1"/>
-            <a:endParaRPr lang="en-US" sz="2100" dirty="0"/>
-          </a:p>
-          <a:p>
-            <a:pPr lvl="1"/>
-            <a:endParaRPr lang="en-US" sz="2100" dirty="0"/>
           </a:p>
         </p:txBody>
       </p:sp>
@@ -17892,224 +17429,18 @@
           </a:lstStyle>
           <a:p>
             <a:r>
-              <a:rPr lang="en-US" sz="4690" dirty="0">
-                <a:solidFill>
-                  <a:schemeClr val="tx1"/>
-                </a:solidFill>
-              </a:rPr>
-              <a:t>Controller</a:t>
-            </a:r>
-          </a:p>
-        </p:txBody>
-      </p:sp>
-      <p:sp>
-        <p:nvSpPr>
-          <p:cNvPr id="27" name="Rectangle 3"/>
-          <p:cNvSpPr txBox="1">
-            <a:spLocks noChangeArrowheads="1"/>
-          </p:cNvSpPr>
-          <p:nvPr/>
-        </p:nvSpPr>
-        <p:spPr bwMode="auto">
-          <a:xfrm>
-            <a:off x="311937" y="1484315"/>
-            <a:ext cx="8159750" cy="4770437"/>
-          </a:xfrm>
-          <a:prstGeom prst="rect">
-            <a:avLst/>
-          </a:prstGeom>
-          <a:noFill/>
-          <a:ln w="9525">
-            <a:noFill/>
-            <a:miter lim="800000"/>
-            <a:headEnd/>
-            <a:tailEnd/>
-          </a:ln>
-        </p:spPr>
-        <p:txBody>
-          <a:bodyPr vert="horz" wrap="square" lIns="96646" tIns="48323" rIns="96646" bIns="48323" numCol="1" anchor="t" anchorCtr="0" compatLnSpc="1">
-            <a:prstTxWarp prst="textNoShape">
-              <a:avLst/>
-            </a:prstTxWarp>
-          </a:bodyPr>
-          <a:lstStyle>
-            <a:lvl1pPr marL="363538" indent="-363538" algn="l" defTabSz="966788" rtl="0" eaLnBrk="1" fontAlgn="base" hangingPunct="1">
-              <a:spcBef>
-                <a:spcPct val="20000"/>
-              </a:spcBef>
-              <a:spcAft>
-                <a:spcPct val="0"/>
-              </a:spcAft>
-              <a:buChar char="•"/>
-              <a:defRPr sz="2900">
-                <a:solidFill>
-                  <a:schemeClr val="tx1"/>
-                </a:solidFill>
-                <a:latin typeface="+mn-lt"/>
-                <a:ea typeface="+mn-ea"/>
-                <a:cs typeface="+mn-cs"/>
-              </a:defRPr>
-            </a:lvl1pPr>
-            <a:lvl2pPr marL="784225" indent="-301625" algn="l" defTabSz="966788" rtl="0" eaLnBrk="1" fontAlgn="base" hangingPunct="1">
-              <a:spcBef>
-                <a:spcPct val="20000"/>
-              </a:spcBef>
-              <a:spcAft>
-                <a:spcPct val="0"/>
-              </a:spcAft>
-              <a:buChar char="–"/>
-              <a:defRPr sz="2600">
-                <a:solidFill>
-                  <a:schemeClr val="tx1"/>
-                </a:solidFill>
-                <a:latin typeface="+mn-lt"/>
-              </a:defRPr>
-            </a:lvl2pPr>
-            <a:lvl3pPr marL="1208088" indent="-241300" algn="l" defTabSz="966788" rtl="0" eaLnBrk="1" fontAlgn="base" hangingPunct="1">
-              <a:spcBef>
-                <a:spcPct val="20000"/>
-              </a:spcBef>
-              <a:spcAft>
-                <a:spcPct val="0"/>
-              </a:spcAft>
-              <a:buChar char="•"/>
-              <a:defRPr sz="2100">
-                <a:solidFill>
-                  <a:schemeClr val="tx1"/>
-                </a:solidFill>
-                <a:latin typeface="+mn-lt"/>
-              </a:defRPr>
-            </a:lvl3pPr>
-            <a:lvl4pPr marL="1689100" indent="-238125" algn="l" defTabSz="966788" rtl="0" eaLnBrk="1" fontAlgn="base" hangingPunct="1">
-              <a:spcBef>
-                <a:spcPct val="20000"/>
-              </a:spcBef>
-              <a:spcAft>
-                <a:spcPct val="0"/>
-              </a:spcAft>
-              <a:buChar char="–"/>
-              <a:defRPr sz="2100">
-                <a:solidFill>
-                  <a:schemeClr val="tx1"/>
-                </a:solidFill>
-                <a:latin typeface="+mn-lt"/>
-              </a:defRPr>
-            </a:lvl4pPr>
-            <a:lvl5pPr marL="2174875" indent="-241300" algn="l" defTabSz="966788" rtl="0" eaLnBrk="1" fontAlgn="base" hangingPunct="1">
-              <a:spcBef>
-                <a:spcPct val="20000"/>
-              </a:spcBef>
-              <a:spcAft>
-                <a:spcPct val="0"/>
-              </a:spcAft>
-              <a:buChar char="»"/>
-              <a:defRPr sz="2100">
-                <a:solidFill>
-                  <a:schemeClr val="tx1"/>
-                </a:solidFill>
-                <a:latin typeface="+mn-lt"/>
-              </a:defRPr>
-            </a:lvl5pPr>
-            <a:lvl6pPr marL="2632075" indent="-241300" algn="l" defTabSz="966788" rtl="0" eaLnBrk="1" fontAlgn="base" hangingPunct="1">
-              <a:spcBef>
-                <a:spcPct val="20000"/>
-              </a:spcBef>
-              <a:spcAft>
-                <a:spcPct val="0"/>
-              </a:spcAft>
-              <a:buChar char="»"/>
-              <a:defRPr sz="2100">
-                <a:solidFill>
-                  <a:schemeClr val="tx1"/>
-                </a:solidFill>
-                <a:latin typeface="+mn-lt"/>
-              </a:defRPr>
-            </a:lvl6pPr>
-            <a:lvl7pPr marL="3089275" indent="-241300" algn="l" defTabSz="966788" rtl="0" eaLnBrk="1" fontAlgn="base" hangingPunct="1">
-              <a:spcBef>
-                <a:spcPct val="20000"/>
-              </a:spcBef>
-              <a:spcAft>
-                <a:spcPct val="0"/>
-              </a:spcAft>
-              <a:buChar char="»"/>
-              <a:defRPr sz="2100">
-                <a:solidFill>
-                  <a:schemeClr val="tx1"/>
-                </a:solidFill>
-                <a:latin typeface="+mn-lt"/>
-              </a:defRPr>
-            </a:lvl7pPr>
-            <a:lvl8pPr marL="3546475" indent="-241300" algn="l" defTabSz="966788" rtl="0" eaLnBrk="1" fontAlgn="base" hangingPunct="1">
-              <a:spcBef>
-                <a:spcPct val="20000"/>
-              </a:spcBef>
-              <a:spcAft>
-                <a:spcPct val="0"/>
-              </a:spcAft>
-              <a:buChar char="»"/>
-              <a:defRPr sz="2100">
-                <a:solidFill>
-                  <a:schemeClr val="tx1"/>
-                </a:solidFill>
-                <a:latin typeface="+mn-lt"/>
-              </a:defRPr>
-            </a:lvl8pPr>
-            <a:lvl9pPr marL="4003675" indent="-241300" algn="l" defTabSz="966788" rtl="0" eaLnBrk="1" fontAlgn="base" hangingPunct="1">
-              <a:spcBef>
-                <a:spcPct val="20000"/>
-              </a:spcBef>
-              <a:spcAft>
-                <a:spcPct val="0"/>
-              </a:spcAft>
-              <a:buChar char="»"/>
-              <a:defRPr sz="2100">
-                <a:solidFill>
-                  <a:schemeClr val="tx1"/>
-                </a:solidFill>
-                <a:latin typeface="+mn-lt"/>
-              </a:defRPr>
-            </a:lvl9pPr>
-          </a:lstStyle>
-          <a:p>
-            <a:r>
-              <a:rPr lang="en-US" sz="2400" dirty="0"/>
-              <a:t>Thin and light weight</a:t>
-            </a:r>
-          </a:p>
-          <a:p>
-            <a:r>
-              <a:rPr lang="en-US" sz="2400" dirty="0"/>
-              <a:t>Loosely coupled</a:t>
-            </a:r>
-          </a:p>
-          <a:p>
-            <a:r>
-              <a:rPr lang="en-US" sz="2400" dirty="0"/>
-              <a:t>Things to test:</a:t>
-            </a:r>
-          </a:p>
-          <a:p>
-            <a:pPr lvl="1"/>
-            <a:r>
-              <a:rPr lang="en-US" sz="2100" dirty="0"/>
-              <a:t>Takes correct action</a:t>
-            </a:r>
-          </a:p>
-          <a:p>
-            <a:pPr lvl="1"/>
-            <a:r>
-              <a:rPr lang="en-US" sz="2100" dirty="0"/>
-              <a:t>Includes the right stuff</a:t>
-            </a:r>
-          </a:p>
-          <a:p>
-            <a:pPr lvl="1"/>
-            <a:endParaRPr lang="en-US" sz="2100" dirty="0"/>
-          </a:p>
-          <a:p>
-            <a:pPr lvl="1"/>
-            <a:endParaRPr lang="en-US" sz="2100" dirty="0"/>
+              <a:rPr lang="en-US" sz="4690" dirty="0" smtClean="0">
+                <a:solidFill>
+                  <a:schemeClr val="tx1"/>
+                </a:solidFill>
+              </a:rPr>
+              <a:t>Controllers</a:t>
+            </a:r>
+            <a:endParaRPr lang="en-US" sz="4690" dirty="0">
+              <a:solidFill>
+                <a:schemeClr val="tx1"/>
+              </a:solidFill>
+            </a:endParaRPr>
           </a:p>
         </p:txBody>
       </p:sp>
@@ -18136,7 +17467,7 @@
         </p:blipFill>
         <p:spPr bwMode="auto">
           <a:xfrm>
-            <a:off x="5723998" y="3076575"/>
+            <a:off x="6234984" y="3291727"/>
             <a:ext cx="2505075" cy="2686050"/>
           </a:xfrm>
           <a:prstGeom prst="rect">
@@ -18724,256 +18055,6 @@
           </a:p>
           <a:p>
             <a:endParaRPr lang="en-US" sz="2400" dirty="0"/>
-          </a:p>
-        </p:txBody>
-      </p:sp>
-      <p:sp>
-        <p:nvSpPr>
-          <p:cNvPr id="4" name="Rectangle 3"/>
-          <p:cNvSpPr txBox="1">
-            <a:spLocks noChangeArrowheads="1"/>
-          </p:cNvSpPr>
-          <p:nvPr/>
-        </p:nvSpPr>
-        <p:spPr bwMode="auto">
-          <a:xfrm>
-            <a:off x="682158" y="1484315"/>
-            <a:ext cx="8159750" cy="4770437"/>
-          </a:xfrm>
-          <a:prstGeom prst="rect">
-            <a:avLst/>
-          </a:prstGeom>
-          <a:noFill/>
-          <a:ln w="9525">
-            <a:noFill/>
-            <a:miter lim="800000"/>
-            <a:headEnd/>
-            <a:tailEnd/>
-          </a:ln>
-        </p:spPr>
-        <p:txBody>
-          <a:bodyPr vert="horz" wrap="square" lIns="96646" tIns="48323" rIns="96646" bIns="48323" numCol="1" anchor="t" anchorCtr="0" compatLnSpc="1">
-            <a:prstTxWarp prst="textNoShape">
-              <a:avLst/>
-            </a:prstTxWarp>
-          </a:bodyPr>
-          <a:lstStyle>
-            <a:lvl1pPr marL="363538" indent="-363538" algn="l" defTabSz="966788" rtl="0" eaLnBrk="1" fontAlgn="base" hangingPunct="1">
-              <a:spcBef>
-                <a:spcPct val="20000"/>
-              </a:spcBef>
-              <a:spcAft>
-                <a:spcPct val="0"/>
-              </a:spcAft>
-              <a:buChar char="•"/>
-              <a:defRPr sz="2900">
-                <a:solidFill>
-                  <a:schemeClr val="tx1"/>
-                </a:solidFill>
-                <a:latin typeface="+mn-lt"/>
-                <a:ea typeface="+mn-ea"/>
-                <a:cs typeface="+mn-cs"/>
-              </a:defRPr>
-            </a:lvl1pPr>
-            <a:lvl2pPr marL="784225" indent="-301625" algn="l" defTabSz="966788" rtl="0" eaLnBrk="1" fontAlgn="base" hangingPunct="1">
-              <a:spcBef>
-                <a:spcPct val="20000"/>
-              </a:spcBef>
-              <a:spcAft>
-                <a:spcPct val="0"/>
-              </a:spcAft>
-              <a:buChar char="–"/>
-              <a:defRPr sz="2600">
-                <a:solidFill>
-                  <a:schemeClr val="tx1"/>
-                </a:solidFill>
-                <a:latin typeface="+mn-lt"/>
-              </a:defRPr>
-            </a:lvl2pPr>
-            <a:lvl3pPr marL="1208088" indent="-241300" algn="l" defTabSz="966788" rtl="0" eaLnBrk="1" fontAlgn="base" hangingPunct="1">
-              <a:spcBef>
-                <a:spcPct val="20000"/>
-              </a:spcBef>
-              <a:spcAft>
-                <a:spcPct val="0"/>
-              </a:spcAft>
-              <a:buChar char="•"/>
-              <a:defRPr sz="2100">
-                <a:solidFill>
-                  <a:schemeClr val="tx1"/>
-                </a:solidFill>
-                <a:latin typeface="+mn-lt"/>
-              </a:defRPr>
-            </a:lvl3pPr>
-            <a:lvl4pPr marL="1689100" indent="-238125" algn="l" defTabSz="966788" rtl="0" eaLnBrk="1" fontAlgn="base" hangingPunct="1">
-              <a:spcBef>
-                <a:spcPct val="20000"/>
-              </a:spcBef>
-              <a:spcAft>
-                <a:spcPct val="0"/>
-              </a:spcAft>
-              <a:buChar char="–"/>
-              <a:defRPr sz="2100">
-                <a:solidFill>
-                  <a:schemeClr val="tx1"/>
-                </a:solidFill>
-                <a:latin typeface="+mn-lt"/>
-              </a:defRPr>
-            </a:lvl4pPr>
-            <a:lvl5pPr marL="2174875" indent="-241300" algn="l" defTabSz="966788" rtl="0" eaLnBrk="1" fontAlgn="base" hangingPunct="1">
-              <a:spcBef>
-                <a:spcPct val="20000"/>
-              </a:spcBef>
-              <a:spcAft>
-                <a:spcPct val="0"/>
-              </a:spcAft>
-              <a:buChar char="»"/>
-              <a:defRPr sz="2100">
-                <a:solidFill>
-                  <a:schemeClr val="tx1"/>
-                </a:solidFill>
-                <a:latin typeface="+mn-lt"/>
-              </a:defRPr>
-            </a:lvl5pPr>
-            <a:lvl6pPr marL="2632075" indent="-241300" algn="l" defTabSz="966788" rtl="0" eaLnBrk="1" fontAlgn="base" hangingPunct="1">
-              <a:spcBef>
-                <a:spcPct val="20000"/>
-              </a:spcBef>
-              <a:spcAft>
-                <a:spcPct val="0"/>
-              </a:spcAft>
-              <a:buChar char="»"/>
-              <a:defRPr sz="2100">
-                <a:solidFill>
-                  <a:schemeClr val="tx1"/>
-                </a:solidFill>
-                <a:latin typeface="+mn-lt"/>
-              </a:defRPr>
-            </a:lvl6pPr>
-            <a:lvl7pPr marL="3089275" indent="-241300" algn="l" defTabSz="966788" rtl="0" eaLnBrk="1" fontAlgn="base" hangingPunct="1">
-              <a:spcBef>
-                <a:spcPct val="20000"/>
-              </a:spcBef>
-              <a:spcAft>
-                <a:spcPct val="0"/>
-              </a:spcAft>
-              <a:buChar char="»"/>
-              <a:defRPr sz="2100">
-                <a:solidFill>
-                  <a:schemeClr val="tx1"/>
-                </a:solidFill>
-                <a:latin typeface="+mn-lt"/>
-              </a:defRPr>
-            </a:lvl7pPr>
-            <a:lvl8pPr marL="3546475" indent="-241300" algn="l" defTabSz="966788" rtl="0" eaLnBrk="1" fontAlgn="base" hangingPunct="1">
-              <a:spcBef>
-                <a:spcPct val="20000"/>
-              </a:spcBef>
-              <a:spcAft>
-                <a:spcPct val="0"/>
-              </a:spcAft>
-              <a:buChar char="»"/>
-              <a:defRPr sz="2100">
-                <a:solidFill>
-                  <a:schemeClr val="tx1"/>
-                </a:solidFill>
-                <a:latin typeface="+mn-lt"/>
-              </a:defRPr>
-            </a:lvl8pPr>
-            <a:lvl9pPr marL="4003675" indent="-241300" algn="l" defTabSz="966788" rtl="0" eaLnBrk="1" fontAlgn="base" hangingPunct="1">
-              <a:spcBef>
-                <a:spcPct val="20000"/>
-              </a:spcBef>
-              <a:spcAft>
-                <a:spcPct val="0"/>
-              </a:spcAft>
-              <a:buChar char="»"/>
-              <a:defRPr sz="2100">
-                <a:solidFill>
-                  <a:schemeClr val="tx1"/>
-                </a:solidFill>
-                <a:latin typeface="+mn-lt"/>
-              </a:defRPr>
-            </a:lvl9pPr>
-          </a:lstStyle>
-          <a:p>
-            <a:r>
-              <a:rPr lang="en-US" sz="2400" dirty="0"/>
-              <a:t>Automate the browser from your tests</a:t>
-            </a:r>
-          </a:p>
-          <a:p>
-            <a:r>
-              <a:rPr lang="en-US" sz="2400" dirty="0"/>
-              <a:t>Supports IE and </a:t>
-            </a:r>
-            <a:r>
-              <a:rPr lang="en-US" sz="2400" dirty="0" err="1"/>
-              <a:t>FireFox</a:t>
-            </a:r>
-            <a:endParaRPr lang="en-US" sz="2400" dirty="0"/>
-          </a:p>
-          <a:p>
-            <a:r>
-              <a:rPr lang="en-US" sz="2400" dirty="0"/>
-              <a:t>Allows you test</a:t>
-            </a:r>
-          </a:p>
-          <a:p>
-            <a:pPr lvl="1"/>
-            <a:r>
-              <a:rPr lang="en-US" sz="2100" dirty="0"/>
-              <a:t>Navigation</a:t>
-            </a:r>
-          </a:p>
-          <a:p>
-            <a:pPr lvl="1"/>
-            <a:r>
-              <a:rPr lang="en-US" sz="2100" dirty="0"/>
-              <a:t>Display logic (visible, </a:t>
-            </a:r>
-            <a:r>
-              <a:rPr lang="en-US" sz="2100" dirty="0" err="1"/>
-              <a:t>etc</a:t>
-            </a:r>
-            <a:r>
-              <a:rPr lang="en-US" sz="2100" dirty="0"/>
-              <a:t>)</a:t>
-            </a:r>
-          </a:p>
-          <a:p>
-            <a:pPr lvl="1"/>
-            <a:r>
-              <a:rPr lang="en-US" sz="2100" dirty="0"/>
-              <a:t>Dialogs</a:t>
-            </a:r>
-          </a:p>
-          <a:p>
-            <a:r>
-              <a:rPr lang="en-US" sz="2400" dirty="0"/>
-              <a:t>Free</a:t>
-            </a:r>
-          </a:p>
-          <a:p>
-            <a:endParaRPr lang="en-US" sz="2400" dirty="0"/>
-          </a:p>
-          <a:p>
-            <a:endParaRPr lang="en-US" sz="2400" dirty="0"/>
-          </a:p>
-          <a:p>
-            <a:r>
-              <a:rPr lang="en-US" sz="2400" dirty="0"/>
-              <a:t>*Not meant to be an end to end solution</a:t>
-            </a:r>
-            <a:endParaRPr lang="en-US" sz="2100" dirty="0"/>
-          </a:p>
-          <a:p>
-            <a:pPr lvl="1"/>
-            <a:endParaRPr lang="en-US" sz="2100" dirty="0"/>
-          </a:p>
-          <a:p>
-            <a:pPr lvl="1"/>
-            <a:endParaRPr lang="en-US" sz="2100" dirty="0"/>
           </a:p>
         </p:txBody>
       </p:sp>
@@ -22485,15 +21566,6 @@
 </file>
 
 <file path=customXml/item1.xml><?xml version="1.0" encoding="utf-8"?>
-<?mso-contentType ?>
-<FormTemplates xmlns="http://schemas.microsoft.com/sharepoint/v3/contenttype/forms">
-  <Display>DocumentLibraryForm</Display>
-  <Edit>DocumentLibraryForm</Edit>
-  <New>DocumentLibraryForm</New>
-</FormTemplates>
-</file>
-
-<file path=customXml/item2.xml><?xml version="1.0" encoding="utf-8"?>
 <p:properties xmlns:p="http://schemas.microsoft.com/office/2006/metadata/properties" xmlns:xsi="http://www.w3.org/2001/XMLSchema-instance" xmlns:pc="http://schemas.microsoft.com/office/infopath/2007/PartnerControls">
   <documentManagement>
     <Description0 xmlns="1e37aee8-73ad-441e-bced-8b530ad9291b">PowerPoint template with Microsoft Partner Network logo on it.</Description0>
@@ -22506,53 +21578,16 @@
 </p:properties>
 </file>
 
-<file path=customXml/item3.xml><?xml version="1.0" encoding="utf-8"?>
+<file path=customXml/item2.xml><?xml version="1.0" encoding="utf-8"?>
 <?mso-contentType ?>
-<spe:Receivers xmlns:spe="http://schemas.microsoft.com/sharepoint/events">
-  <Receiver>
-    <Name>Document ID Generator</Name>
-    <Synchronization>Synchronous</Synchronization>
-    <Type>10001</Type>
-    <SequenceNumber>1000</SequenceNumber>
-    <Assembly>Microsoft.Office.DocumentManagement, Version=14.0.0.0, Culture=neutral, PublicKeyToken=71e9bce111e9429c</Assembly>
-    <Class>Microsoft.Office.DocumentManagement.Internal.DocIdHandler</Class>
-    <Data/>
-    <Filter/>
-  </Receiver>
-  <Receiver>
-    <Name>Document ID Generator</Name>
-    <Synchronization>Synchronous</Synchronization>
-    <Type>10002</Type>
-    <SequenceNumber>1001</SequenceNumber>
-    <Assembly>Microsoft.Office.DocumentManagement, Version=14.0.0.0, Culture=neutral, PublicKeyToken=71e9bce111e9429c</Assembly>
-    <Class>Microsoft.Office.DocumentManagement.Internal.DocIdHandler</Class>
-    <Data/>
-    <Filter/>
-  </Receiver>
-  <Receiver>
-    <Name>Document ID Generator</Name>
-    <Synchronization>Synchronous</Synchronization>
-    <Type>10004</Type>
-    <SequenceNumber>1002</SequenceNumber>
-    <Assembly>Microsoft.Office.DocumentManagement, Version=14.0.0.0, Culture=neutral, PublicKeyToken=71e9bce111e9429c</Assembly>
-    <Class>Microsoft.Office.DocumentManagement.Internal.DocIdHandler</Class>
-    <Data/>
-    <Filter/>
-  </Receiver>
-  <Receiver>
-    <Name>Document ID Generator</Name>
-    <Synchronization>Synchronous</Synchronization>
-    <Type>10006</Type>
-    <SequenceNumber>1003</SequenceNumber>
-    <Assembly>Microsoft.Office.DocumentManagement, Version=14.0.0.0, Culture=neutral, PublicKeyToken=71e9bce111e9429c</Assembly>
-    <Class>Microsoft.Office.DocumentManagement.Internal.DocIdHandler</Class>
-    <Data/>
-    <Filter/>
-  </Receiver>
-</spe:Receivers>
+<FormTemplates xmlns="http://schemas.microsoft.com/sharepoint/v3/contenttype/forms">
+  <Display>DocumentLibraryForm</Display>
+  <Edit>DocumentLibraryForm</Edit>
+  <New>DocumentLibraryForm</New>
+</FormTemplates>
 </file>
 
-<file path=customXml/item4.xml><?xml version="1.0" encoding="utf-8"?>
+<file path=customXml/item3.xml><?xml version="1.0" encoding="utf-8"?>
 <ct:contentTypeSchema xmlns:ct="http://schemas.microsoft.com/office/2006/metadata/contentType" xmlns:ma="http://schemas.microsoft.com/office/2006/metadata/properties/metaAttributes" ct:_="" ma:_="" ma:contentTypeName="Document" ma:contentTypeID="0x0101004D2E750987EE2543B234B3A674D6BE3D" ma:contentTypeVersion="105" ma:contentTypeDescription="Create a new document." ma:contentTypeScope="" ma:versionID="62fa037737ae31885dcb260bd5c7d1f2">
   <xsd:schema xmlns:xsd="http://www.w3.org/2001/XMLSchema" xmlns:xs="http://www.w3.org/2001/XMLSchema" xmlns:p="http://schemas.microsoft.com/office/2006/metadata/properties" xmlns:ns2="1e37aee8-73ad-441e-bced-8b530ad9291b" xmlns:ns3="52ad97b0-86c1-49b5-b544-c488bf38e7c0" targetNamespace="http://schemas.microsoft.com/office/2006/metadata/properties" ma:root="true" ma:fieldsID="ce0d2501b4c25830d7e1734de94951c7" ns2:_="" ns3:_="">
     <xsd:import namespace="1e37aee8-73ad-441e-bced-8b530ad9291b"/>
@@ -22710,15 +21745,53 @@
 </ct:contentTypeSchema>
 </file>
 
-<file path=customXml/itemProps1.xml><?xml version="1.0" encoding="utf-8"?>
-<ds:datastoreItem xmlns:ds="http://schemas.openxmlformats.org/officeDocument/2006/customXml" ds:itemID="{B6DBE1C9-0895-41F8-89A3-98DC40E912B0}">
-  <ds:schemaRefs>
-    <ds:schemaRef ds:uri="http://schemas.microsoft.com/sharepoint/v3/contenttype/forms"/>
-  </ds:schemaRefs>
-</ds:datastoreItem>
+<file path=customXml/item4.xml><?xml version="1.0" encoding="utf-8"?>
+<?mso-contentType ?>
+<spe:Receivers xmlns:spe="http://schemas.microsoft.com/sharepoint/events">
+  <Receiver>
+    <Name>Document ID Generator</Name>
+    <Synchronization>Synchronous</Synchronization>
+    <Type>10001</Type>
+    <SequenceNumber>1000</SequenceNumber>
+    <Assembly>Microsoft.Office.DocumentManagement, Version=14.0.0.0, Culture=neutral, PublicKeyToken=71e9bce111e9429c</Assembly>
+    <Class>Microsoft.Office.DocumentManagement.Internal.DocIdHandler</Class>
+    <Data/>
+    <Filter/>
+  </Receiver>
+  <Receiver>
+    <Name>Document ID Generator</Name>
+    <Synchronization>Synchronous</Synchronization>
+    <Type>10002</Type>
+    <SequenceNumber>1001</SequenceNumber>
+    <Assembly>Microsoft.Office.DocumentManagement, Version=14.0.0.0, Culture=neutral, PublicKeyToken=71e9bce111e9429c</Assembly>
+    <Class>Microsoft.Office.DocumentManagement.Internal.DocIdHandler</Class>
+    <Data/>
+    <Filter/>
+  </Receiver>
+  <Receiver>
+    <Name>Document ID Generator</Name>
+    <Synchronization>Synchronous</Synchronization>
+    <Type>10004</Type>
+    <SequenceNumber>1002</SequenceNumber>
+    <Assembly>Microsoft.Office.DocumentManagement, Version=14.0.0.0, Culture=neutral, PublicKeyToken=71e9bce111e9429c</Assembly>
+    <Class>Microsoft.Office.DocumentManagement.Internal.DocIdHandler</Class>
+    <Data/>
+    <Filter/>
+  </Receiver>
+  <Receiver>
+    <Name>Document ID Generator</Name>
+    <Synchronization>Synchronous</Synchronization>
+    <Type>10006</Type>
+    <SequenceNumber>1003</SequenceNumber>
+    <Assembly>Microsoft.Office.DocumentManagement, Version=14.0.0.0, Culture=neutral, PublicKeyToken=71e9bce111e9429c</Assembly>
+    <Class>Microsoft.Office.DocumentManagement.Internal.DocIdHandler</Class>
+    <Data/>
+    <Filter/>
+  </Receiver>
+</spe:Receivers>
 </file>
 
-<file path=customXml/itemProps2.xml><?xml version="1.0" encoding="utf-8"?>
+<file path=customXml/itemProps1.xml><?xml version="1.0" encoding="utf-8"?>
 <ds:datastoreItem xmlns:ds="http://schemas.openxmlformats.org/officeDocument/2006/customXml" ds:itemID="{9F5040E5-4564-49C1-9147-56F1700A1C56}">
   <ds:schemaRefs>
     <ds:schemaRef ds:uri="http://schemas.microsoft.com/office/2006/documentManagement/types"/>
@@ -22735,15 +21808,15 @@
 </ds:datastoreItem>
 </file>
 
-<file path=customXml/itemProps3.xml><?xml version="1.0" encoding="utf-8"?>
-<ds:datastoreItem xmlns:ds="http://schemas.openxmlformats.org/officeDocument/2006/customXml" ds:itemID="{0068A067-F354-4585-8169-FC99DA836E1C}">
+<file path=customXml/itemProps2.xml><?xml version="1.0" encoding="utf-8"?>
+<ds:datastoreItem xmlns:ds="http://schemas.openxmlformats.org/officeDocument/2006/customXml" ds:itemID="{B6DBE1C9-0895-41F8-89A3-98DC40E912B0}">
   <ds:schemaRefs>
-    <ds:schemaRef ds:uri="http://schemas.microsoft.com/sharepoint/events"/>
+    <ds:schemaRef ds:uri="http://schemas.microsoft.com/sharepoint/v3/contenttype/forms"/>
   </ds:schemaRefs>
 </ds:datastoreItem>
 </file>
 
-<file path=customXml/itemProps4.xml><?xml version="1.0" encoding="utf-8"?>
+<file path=customXml/itemProps3.xml><?xml version="1.0" encoding="utf-8"?>
 <ds:datastoreItem xmlns:ds="http://schemas.openxmlformats.org/officeDocument/2006/customXml" ds:itemID="{B03FC495-EB61-4A2C-B8E7-345CEB92DF9F}">
   <ds:schemaRefs>
     <ds:schemaRef ds:uri="http://schemas.microsoft.com/office/2006/metadata/contentType"/>
@@ -22760,4 +21833,12 @@
     <ds:schemaRef ds:uri="http://schemas.microsoft.com/internal/obd"/>
   </ds:schemaRefs>
 </ds:datastoreItem>
+</file>
+
+<file path=customXml/itemProps4.xml><?xml version="1.0" encoding="utf-8"?>
+<ds:datastoreItem xmlns:ds="http://schemas.openxmlformats.org/officeDocument/2006/customXml" ds:itemID="{0068A067-F354-4585-8169-FC99DA836E1C}">
+  <ds:schemaRefs>
+    <ds:schemaRef ds:uri="http://schemas.microsoft.com/sharepoint/events"/>
+  </ds:schemaRefs>
+</ds:datastoreItem>
 </file>
</xml_diff>